<commit_message>
Created 2 New Classes
1 For Checking if two people have matched
1 for entering confirmed Match data
</commit_message>
<xml_diff>
--- a/BABLPowerPoint.pptx
+++ b/BABLPowerPoint.pptx
@@ -291,7 +291,7 @@
               <a:pPr>
                 <a:defRPr/>
               </a:pPr>
-              <a:t>3/16/2017</a:t>
+              <a:t>3/17/2017</a:t>
             </a:fld>
             <a:endParaRPr lang="en-US" dirty="0"/>
           </a:p>
@@ -503,7 +503,7 @@
               <a:pPr>
                 <a:defRPr/>
               </a:pPr>
-              <a:t>3/16/2017</a:t>
+              <a:t>3/17/2017</a:t>
             </a:fld>
             <a:endParaRPr lang="en-US" dirty="0"/>
           </a:p>
@@ -4566,6 +4566,40 @@
           </a:p>
         </p:txBody>
       </p:sp>
+      <p:pic>
+        <p:nvPicPr>
+          <p:cNvPr id="4" name="Picture 3"/>
+          <p:cNvPicPr>
+            <a:picLocks noChangeAspect="1"/>
+          </p:cNvPicPr>
+          <p:nvPr/>
+        </p:nvPicPr>
+        <p:blipFill>
+          <a:blip r:embed="rId4"/>
+          <a:stretch>
+            <a:fillRect/>
+          </a:stretch>
+        </p:blipFill>
+        <p:spPr>
+          <a:xfrm>
+            <a:off x="5885049" y="2608727"/>
+            <a:ext cx="2272833" cy="4040593"/>
+          </a:xfrm>
+          <a:prstGeom prst="rect">
+            <a:avLst/>
+          </a:prstGeom>
+          <a:ln>
+            <a:noFill/>
+          </a:ln>
+          <a:effectLst>
+            <a:outerShdw blurRad="292100" dist="139700" dir="2700000" algn="tl" rotWithShape="0">
+              <a:srgbClr val="333333">
+                <a:alpha val="65000"/>
+              </a:srgbClr>
+            </a:outerShdw>
+          </a:effectLst>
+        </p:spPr>
+      </p:pic>
     </p:spTree>
     <p:extLst>
       <p:ext uri="{BB962C8B-B14F-4D97-AF65-F5344CB8AC3E}">
@@ -4910,6 +4944,178 @@
               <a:rPr lang="en-US" sz="3400" dirty="0"/>
               <a:t>BABL: Technology Summary</a:t>
             </a:r>
+          </a:p>
+        </p:txBody>
+      </p:sp>
+      <p:pic>
+        <p:nvPicPr>
+          <p:cNvPr id="4" name="Picture 3"/>
+          <p:cNvPicPr>
+            <a:picLocks noChangeAspect="1"/>
+          </p:cNvPicPr>
+          <p:nvPr/>
+        </p:nvPicPr>
+        <p:blipFill>
+          <a:blip r:embed="rId4"/>
+          <a:stretch>
+            <a:fillRect/>
+          </a:stretch>
+        </p:blipFill>
+        <p:spPr>
+          <a:xfrm>
+            <a:off x="5898778" y="2581837"/>
+            <a:ext cx="2273427" cy="4041648"/>
+          </a:xfrm>
+          <a:prstGeom prst="rect">
+            <a:avLst/>
+          </a:prstGeom>
+          <a:ln>
+            <a:noFill/>
+          </a:ln>
+          <a:effectLst>
+            <a:outerShdw blurRad="292100" dist="139700" dir="2700000" algn="tl" rotWithShape="0">
+              <a:srgbClr val="333333">
+                <a:alpha val="65000"/>
+              </a:srgbClr>
+            </a:outerShdw>
+          </a:effectLst>
+        </p:spPr>
+      </p:pic>
+      <p:sp>
+        <p:nvSpPr>
+          <p:cNvPr id="5" name="Rectangle 4"/>
+          <p:cNvSpPr/>
+          <p:nvPr/>
+        </p:nvSpPr>
+        <p:spPr>
+          <a:xfrm>
+            <a:off x="4758697" y="1830962"/>
+            <a:ext cx="1317989" cy="646331"/>
+          </a:xfrm>
+          <a:prstGeom prst="rect">
+            <a:avLst/>
+          </a:prstGeom>
+          <a:noFill/>
+        </p:spPr>
+        <p:txBody>
+          <a:bodyPr wrap="none" lIns="91440" tIns="45720" rIns="91440" bIns="45720">
+            <a:spAutoFit/>
+          </a:bodyPr>
+          <a:lstStyle/>
+          <a:p>
+            <a:pPr algn="ctr"/>
+            <a:r>
+              <a:rPr lang="en-US" sz="1200" u="sng" dirty="0">
+                <a:ln w="0"/>
+                <a:effectLst>
+                  <a:outerShdw blurRad="38100" dist="19050" dir="2700000" algn="tl" rotWithShape="0">
+                    <a:schemeClr val="dk1">
+                      <a:alpha val="40000"/>
+                    </a:schemeClr>
+                  </a:outerShdw>
+                </a:effectLst>
+              </a:rPr>
+              <a:t>Banner Image </a:t>
+            </a:r>
+          </a:p>
+          <a:p>
+            <a:pPr algn="ctr"/>
+            <a:r>
+              <a:rPr lang="en-US" sz="1200" u="sng" dirty="0">
+                <a:ln w="0"/>
+                <a:effectLst>
+                  <a:outerShdw blurRad="38100" dist="19050" dir="2700000" algn="tl" rotWithShape="0">
+                    <a:schemeClr val="dk1">
+                      <a:alpha val="40000"/>
+                    </a:schemeClr>
+                  </a:outerShdw>
+                </a:effectLst>
+              </a:rPr>
+              <a:t>Changes Based </a:t>
+            </a:r>
+          </a:p>
+          <a:p>
+            <a:pPr algn="ctr"/>
+            <a:r>
+              <a:rPr lang="en-US" sz="1200" u="sng" dirty="0">
+                <a:ln w="0"/>
+                <a:effectLst>
+                  <a:outerShdw blurRad="38100" dist="19050" dir="2700000" algn="tl" rotWithShape="0">
+                    <a:schemeClr val="dk1">
+                      <a:alpha val="40000"/>
+                    </a:schemeClr>
+                  </a:outerShdw>
+                </a:effectLst>
+              </a:rPr>
+              <a:t>On Campus</a:t>
+            </a:r>
+          </a:p>
+        </p:txBody>
+      </p:sp>
+      <p:sp>
+        <p:nvSpPr>
+          <p:cNvPr id="10" name="Arrow: Bent-Up 9"/>
+          <p:cNvSpPr/>
+          <p:nvPr/>
+        </p:nvSpPr>
+        <p:spPr bwMode="auto">
+          <a:xfrm rot="5400000">
+            <a:off x="5200551" y="2594315"/>
+            <a:ext cx="748644" cy="546847"/>
+          </a:xfrm>
+          <a:prstGeom prst="bentUpArrow">
+            <a:avLst/>
+          </a:prstGeom>
+          <a:solidFill>
+            <a:schemeClr val="tx1"/>
+          </a:solidFill>
+          <a:ln w="9525" cap="flat" cmpd="sng" algn="ctr">
+            <a:solidFill>
+              <a:schemeClr val="tx1"/>
+            </a:solidFill>
+            <a:prstDash val="solid"/>
+            <a:round/>
+            <a:headEnd type="none" w="med" len="med"/>
+            <a:tailEnd type="none" w="med" len="med"/>
+          </a:ln>
+          <a:effectLst/>
+        </p:spPr>
+        <p:txBody>
+          <a:bodyPr vert="horz" wrap="square" lIns="91440" tIns="45720" rIns="91440" bIns="45720" numCol="1" rtlCol="0" anchor="t" anchorCtr="0" compatLnSpc="1">
+            <a:prstTxWarp prst="textNoShape">
+              <a:avLst/>
+            </a:prstTxWarp>
+          </a:bodyPr>
+          <a:lstStyle/>
+          <a:p>
+            <a:pPr marL="0" marR="0" indent="0" algn="l" defTabSz="914400" rtl="0" eaLnBrk="0" fontAlgn="base" latinLnBrk="0" hangingPunct="0">
+              <a:lnSpc>
+                <a:spcPct val="100000"/>
+              </a:lnSpc>
+              <a:spcBef>
+                <a:spcPct val="0"/>
+              </a:spcBef>
+              <a:spcAft>
+                <a:spcPct val="0"/>
+              </a:spcAft>
+              <a:buClrTx/>
+              <a:buSzTx/>
+              <a:buFontTx/>
+              <a:buNone/>
+              <a:tabLst/>
+            </a:pPr>
+            <a:endParaRPr kumimoji="0" lang="en-US" sz="2400" b="0" i="0" u="none" strike="noStrike" cap="none" normalizeH="0" baseline="0">
+              <a:ln>
+                <a:noFill/>
+              </a:ln>
+              <a:solidFill>
+                <a:schemeClr val="tx1"/>
+              </a:solidFill>
+              <a:effectLst/>
+              <a:latin typeface="Arial" pitchFamily="-108" charset="0"/>
+              <a:ea typeface="ＭＳ Ｐゴシック" pitchFamily="-108" charset="-128"/>
+              <a:cs typeface="ＭＳ Ｐゴシック" pitchFamily="-108" charset="-128"/>
+            </a:endParaRPr>
           </a:p>
         </p:txBody>
       </p:sp>
@@ -6672,21 +6878,6 @@
 </file>
 
 <file path=customXml/item1.xml><?xml version="1.0" encoding="utf-8"?>
-<?mso-contentType ?>
-<FormTemplates xmlns="http://schemas.microsoft.com/sharepoint/v3/contenttype/forms">
-  <Display>DocumentLibraryForm</Display>
-  <Edit>DocumentLibraryForm</Edit>
-  <New>DocumentLibraryForm</New>
-</FormTemplates>
-</file>
-
-<file path=customXml/item2.xml><?xml version="1.0" encoding="utf-8"?>
-<p:properties xmlns:p="http://schemas.microsoft.com/office/2006/metadata/properties" xmlns:xsi="http://www.w3.org/2001/XMLSchema-instance" xmlns:pc="http://schemas.microsoft.com/office/infopath/2007/PartnerControls">
-  <documentManagement/>
-</p:properties>
-</file>
-
-<file path=customXml/item3.xml><?xml version="1.0" encoding="utf-8"?>
 <ct:contentTypeSchema xmlns:ct="http://schemas.microsoft.com/office/2006/metadata/contentType" xmlns:ma="http://schemas.microsoft.com/office/2006/metadata/properties/metaAttributes" ct:_="" ma:_="" ma:contentTypeName="Document" ma:contentTypeID="0x01010058C64DCBBBB02E47B40AAE6C01CFFF74" ma:contentTypeVersion="1" ma:contentTypeDescription="Create a new document." ma:contentTypeScope="" ma:versionID="ed9f4f4e58614d4f82a4863f2a55a10b">
   <xsd:schema xmlns:xsd="http://www.w3.org/2001/XMLSchema" xmlns:xs="http://www.w3.org/2001/XMLSchema" xmlns:p="http://schemas.microsoft.com/office/2006/metadata/properties" xmlns:ns3="75fa4488-412e-4aad-a494-5f11aff3f35a" targetNamespace="http://schemas.microsoft.com/office/2006/metadata/properties" ma:root="true" ma:fieldsID="9e40df8ca300f98e02f87cfdfa8a0fec" ns3:_="">
     <xsd:import namespace="75fa4488-412e-4aad-a494-5f11aff3f35a"/>
@@ -6826,10 +7017,35 @@
 </ct:contentTypeSchema>
 </file>
 
+<file path=customXml/item2.xml><?xml version="1.0" encoding="utf-8"?>
+<p:properties xmlns:p="http://schemas.microsoft.com/office/2006/metadata/properties" xmlns:xsi="http://www.w3.org/2001/XMLSchema-instance" xmlns:pc="http://schemas.microsoft.com/office/infopath/2007/PartnerControls">
+  <documentManagement/>
+</p:properties>
+</file>
+
+<file path=customXml/item3.xml><?xml version="1.0" encoding="utf-8"?>
+<?mso-contentType ?>
+<FormTemplates xmlns="http://schemas.microsoft.com/sharepoint/v3/contenttype/forms">
+  <Display>DocumentLibraryForm</Display>
+  <Edit>DocumentLibraryForm</Edit>
+  <New>DocumentLibraryForm</New>
+</FormTemplates>
+</file>
+
 <file path=customXml/itemProps1.xml><?xml version="1.0" encoding="utf-8"?>
-<ds:datastoreItem xmlns:ds="http://schemas.openxmlformats.org/officeDocument/2006/customXml" ds:itemID="{86BCD1B8-BEDB-412C-86AE-9E7F6160505C}">
+<ds:datastoreItem xmlns:ds="http://schemas.openxmlformats.org/officeDocument/2006/customXml" ds:itemID="{8D5271B5-4D4B-48D0-8119-5E169AFC2124}">
   <ds:schemaRefs>
-    <ds:schemaRef ds:uri="http://schemas.microsoft.com/sharepoint/v3/contenttype/forms"/>
+    <ds:schemaRef ds:uri="http://schemas.microsoft.com/office/2006/metadata/contentType"/>
+    <ds:schemaRef ds:uri="http://schemas.microsoft.com/office/2006/metadata/properties/metaAttributes"/>
+    <ds:schemaRef ds:uri="http://www.w3.org/2001/XMLSchema"/>
+    <ds:schemaRef ds:uri="http://schemas.microsoft.com/office/2006/metadata/properties"/>
+    <ds:schemaRef ds:uri="75fa4488-412e-4aad-a494-5f11aff3f35a"/>
+    <ds:schemaRef ds:uri="http://schemas.microsoft.com/office/2006/documentManagement/types"/>
+    <ds:schemaRef ds:uri="http://schemas.microsoft.com/office/infopath/2007/PartnerControls"/>
+    <ds:schemaRef ds:uri="http://schemas.openxmlformats.org/package/2006/metadata/core-properties"/>
+    <ds:schemaRef ds:uri="http://purl.org/dc/elements/1.1/"/>
+    <ds:schemaRef ds:uri="http://purl.org/dc/terms/"/>
+    <ds:schemaRef ds:uri="http://schemas.microsoft.com/internal/obd"/>
   </ds:schemaRefs>
 </ds:datastoreItem>
 </file>
@@ -6851,19 +7067,9 @@
 </file>
 
 <file path=customXml/itemProps3.xml><?xml version="1.0" encoding="utf-8"?>
-<ds:datastoreItem xmlns:ds="http://schemas.openxmlformats.org/officeDocument/2006/customXml" ds:itemID="{8D5271B5-4D4B-48D0-8119-5E169AFC2124}">
+<ds:datastoreItem xmlns:ds="http://schemas.openxmlformats.org/officeDocument/2006/customXml" ds:itemID="{86BCD1B8-BEDB-412C-86AE-9E7F6160505C}">
   <ds:schemaRefs>
-    <ds:schemaRef ds:uri="http://schemas.microsoft.com/office/2006/metadata/contentType"/>
-    <ds:schemaRef ds:uri="http://schemas.microsoft.com/office/2006/metadata/properties/metaAttributes"/>
-    <ds:schemaRef ds:uri="http://www.w3.org/2001/XMLSchema"/>
-    <ds:schemaRef ds:uri="http://schemas.microsoft.com/office/2006/metadata/properties"/>
-    <ds:schemaRef ds:uri="75fa4488-412e-4aad-a494-5f11aff3f35a"/>
-    <ds:schemaRef ds:uri="http://schemas.microsoft.com/office/2006/documentManagement/types"/>
-    <ds:schemaRef ds:uri="http://schemas.microsoft.com/office/infopath/2007/PartnerControls"/>
-    <ds:schemaRef ds:uri="http://schemas.openxmlformats.org/package/2006/metadata/core-properties"/>
-    <ds:schemaRef ds:uri="http://purl.org/dc/elements/1.1/"/>
-    <ds:schemaRef ds:uri="http://purl.org/dc/terms/"/>
-    <ds:schemaRef ds:uri="http://schemas.microsoft.com/internal/obd"/>
+    <ds:schemaRef ds:uri="http://schemas.microsoft.com/sharepoint/v3/contenttype/forms"/>
   </ds:schemaRefs>
 </ds:datastoreItem>
 </file>
</xml_diff>

<commit_message>
Removed UserId Requirement in MatchRetrieve
Instead of UserId being a parameter of matchRetrieve Class it is now retrieved from the localdata class in the other class.
</commit_message>
<xml_diff>
--- a/BABLPowerPoint.pptx
+++ b/BABLPowerPoint.pptx
@@ -4712,7 +4712,23 @@
                 <a:ea typeface="Calibri" panose="020F0502020204030204" pitchFamily="34" charset="0"/>
                 <a:cs typeface="Times New Roman" panose="02020603050405020304" pitchFamily="18" charset="0"/>
               </a:rPr>
-              <a:t>: Our target market is Android Users at the University of Pittsburgh that speak or want to speak bilingually.</a:t>
+              <a:t>: Our target market is Android Users at the University of Pittsburgh main and </a:t>
+            </a:r>
+            <a:r>
+              <a:rPr lang="en-US" sz="2000">
+                <a:latin typeface="Times New Roman" panose="02020603050405020304" pitchFamily="18" charset="0"/>
+                <a:ea typeface="Calibri" panose="020F0502020204030204" pitchFamily="34" charset="0"/>
+                <a:cs typeface="Times New Roman" panose="02020603050405020304" pitchFamily="18" charset="0"/>
+              </a:rPr>
+              <a:t>regional campuses </a:t>
+            </a:r>
+            <a:r>
+              <a:rPr lang="en-US" sz="2000" dirty="0">
+                <a:latin typeface="Times New Roman" panose="02020603050405020304" pitchFamily="18" charset="0"/>
+                <a:ea typeface="Calibri" panose="020F0502020204030204" pitchFamily="34" charset="0"/>
+                <a:cs typeface="Times New Roman" panose="02020603050405020304" pitchFamily="18" charset="0"/>
+              </a:rPr>
+              <a:t>that speak or want to speak bilingually.</a:t>
             </a:r>
           </a:p>
           <a:p>
@@ -6878,6 +6894,21 @@
 </file>
 
 <file path=customXml/item1.xml><?xml version="1.0" encoding="utf-8"?>
+<?mso-contentType ?>
+<FormTemplates xmlns="http://schemas.microsoft.com/sharepoint/v3/contenttype/forms">
+  <Display>DocumentLibraryForm</Display>
+  <Edit>DocumentLibraryForm</Edit>
+  <New>DocumentLibraryForm</New>
+</FormTemplates>
+</file>
+
+<file path=customXml/item2.xml><?xml version="1.0" encoding="utf-8"?>
+<p:properties xmlns:p="http://schemas.microsoft.com/office/2006/metadata/properties" xmlns:xsi="http://www.w3.org/2001/XMLSchema-instance" xmlns:pc="http://schemas.microsoft.com/office/infopath/2007/PartnerControls">
+  <documentManagement/>
+</p:properties>
+</file>
+
+<file path=customXml/item3.xml><?xml version="1.0" encoding="utf-8"?>
 <ct:contentTypeSchema xmlns:ct="http://schemas.microsoft.com/office/2006/metadata/contentType" xmlns:ma="http://schemas.microsoft.com/office/2006/metadata/properties/metaAttributes" ct:_="" ma:_="" ma:contentTypeName="Document" ma:contentTypeID="0x01010058C64DCBBBB02E47B40AAE6C01CFFF74" ma:contentTypeVersion="1" ma:contentTypeDescription="Create a new document." ma:contentTypeScope="" ma:versionID="ed9f4f4e58614d4f82a4863f2a55a10b">
   <xsd:schema xmlns:xsd="http://www.w3.org/2001/XMLSchema" xmlns:xs="http://www.w3.org/2001/XMLSchema" xmlns:p="http://schemas.microsoft.com/office/2006/metadata/properties" xmlns:ns3="75fa4488-412e-4aad-a494-5f11aff3f35a" targetNamespace="http://schemas.microsoft.com/office/2006/metadata/properties" ma:root="true" ma:fieldsID="9e40df8ca300f98e02f87cfdfa8a0fec" ns3:_="">
     <xsd:import namespace="75fa4488-412e-4aad-a494-5f11aff3f35a"/>
@@ -7017,35 +7048,10 @@
 </ct:contentTypeSchema>
 </file>
 
-<file path=customXml/item2.xml><?xml version="1.0" encoding="utf-8"?>
-<p:properties xmlns:p="http://schemas.microsoft.com/office/2006/metadata/properties" xmlns:xsi="http://www.w3.org/2001/XMLSchema-instance" xmlns:pc="http://schemas.microsoft.com/office/infopath/2007/PartnerControls">
-  <documentManagement/>
-</p:properties>
-</file>
-
-<file path=customXml/item3.xml><?xml version="1.0" encoding="utf-8"?>
-<?mso-contentType ?>
-<FormTemplates xmlns="http://schemas.microsoft.com/sharepoint/v3/contenttype/forms">
-  <Display>DocumentLibraryForm</Display>
-  <Edit>DocumentLibraryForm</Edit>
-  <New>DocumentLibraryForm</New>
-</FormTemplates>
-</file>
-
 <file path=customXml/itemProps1.xml><?xml version="1.0" encoding="utf-8"?>
-<ds:datastoreItem xmlns:ds="http://schemas.openxmlformats.org/officeDocument/2006/customXml" ds:itemID="{8D5271B5-4D4B-48D0-8119-5E169AFC2124}">
+<ds:datastoreItem xmlns:ds="http://schemas.openxmlformats.org/officeDocument/2006/customXml" ds:itemID="{86BCD1B8-BEDB-412C-86AE-9E7F6160505C}">
   <ds:schemaRefs>
-    <ds:schemaRef ds:uri="http://schemas.microsoft.com/office/2006/metadata/contentType"/>
-    <ds:schemaRef ds:uri="http://schemas.microsoft.com/office/2006/metadata/properties/metaAttributes"/>
-    <ds:schemaRef ds:uri="http://www.w3.org/2001/XMLSchema"/>
-    <ds:schemaRef ds:uri="http://schemas.microsoft.com/office/2006/metadata/properties"/>
-    <ds:schemaRef ds:uri="75fa4488-412e-4aad-a494-5f11aff3f35a"/>
-    <ds:schemaRef ds:uri="http://schemas.microsoft.com/office/2006/documentManagement/types"/>
-    <ds:schemaRef ds:uri="http://schemas.microsoft.com/office/infopath/2007/PartnerControls"/>
-    <ds:schemaRef ds:uri="http://schemas.openxmlformats.org/package/2006/metadata/core-properties"/>
-    <ds:schemaRef ds:uri="http://purl.org/dc/elements/1.1/"/>
-    <ds:schemaRef ds:uri="http://purl.org/dc/terms/"/>
-    <ds:schemaRef ds:uri="http://schemas.microsoft.com/internal/obd"/>
+    <ds:schemaRef ds:uri="http://schemas.microsoft.com/sharepoint/v3/contenttype/forms"/>
   </ds:schemaRefs>
 </ds:datastoreItem>
 </file>
@@ -7067,9 +7073,19 @@
 </file>
 
 <file path=customXml/itemProps3.xml><?xml version="1.0" encoding="utf-8"?>
-<ds:datastoreItem xmlns:ds="http://schemas.openxmlformats.org/officeDocument/2006/customXml" ds:itemID="{86BCD1B8-BEDB-412C-86AE-9E7F6160505C}">
+<ds:datastoreItem xmlns:ds="http://schemas.openxmlformats.org/officeDocument/2006/customXml" ds:itemID="{8D5271B5-4D4B-48D0-8119-5E169AFC2124}">
   <ds:schemaRefs>
-    <ds:schemaRef ds:uri="http://schemas.microsoft.com/sharepoint/v3/contenttype/forms"/>
+    <ds:schemaRef ds:uri="http://schemas.microsoft.com/office/2006/metadata/contentType"/>
+    <ds:schemaRef ds:uri="http://schemas.microsoft.com/office/2006/metadata/properties/metaAttributes"/>
+    <ds:schemaRef ds:uri="http://www.w3.org/2001/XMLSchema"/>
+    <ds:schemaRef ds:uri="http://schemas.microsoft.com/office/2006/metadata/properties"/>
+    <ds:schemaRef ds:uri="75fa4488-412e-4aad-a494-5f11aff3f35a"/>
+    <ds:schemaRef ds:uri="http://schemas.microsoft.com/office/2006/documentManagement/types"/>
+    <ds:schemaRef ds:uri="http://schemas.microsoft.com/office/infopath/2007/PartnerControls"/>
+    <ds:schemaRef ds:uri="http://schemas.openxmlformats.org/package/2006/metadata/core-properties"/>
+    <ds:schemaRef ds:uri="http://purl.org/dc/elements/1.1/"/>
+    <ds:schemaRef ds:uri="http://purl.org/dc/terms/"/>
+    <ds:schemaRef ds:uri="http://schemas.microsoft.com/internal/obd"/>
   </ds:schemaRefs>
 </ds:datastoreItem>
 </file>
</xml_diff>